<commit_message>
Fixing spelling and facting
</commit_message>
<xml_diff>
--- a/18 команда. Презентация.pptx
+++ b/18 команда. Презентация.pptx
@@ -24,19 +24,19 @@
   <p:notesSz cx="8229600" cy="14630400"/>
   <p:embeddedFontLst>
     <p:embeddedFont>
-      <p:font typeface="Calibri" panose="020F0502020204030204" pitchFamily="34" charset="0"/>
+      <p:font typeface="DM Sans" charset="0"/>
       <p:regular r:id="rId14"/>
-      <p:bold r:id="rId15"/>
-      <p:italic r:id="rId16"/>
-      <p:boldItalic r:id="rId17"/>
     </p:embeddedFont>
     <p:embeddedFont>
-      <p:font typeface="PT Serif" panose="020B0604020202020204" charset="0"/>
-      <p:regular r:id="rId18"/>
+      <p:font typeface="PT Serif" charset="-52"/>
+      <p:regular r:id="rId15"/>
     </p:embeddedFont>
     <p:embeddedFont>
-      <p:font typeface="DM Sans" panose="020B0604020202020204" charset="0"/>
-      <p:regular r:id="rId19"/>
+      <p:font typeface="Calibri" pitchFamily="34" charset="0"/>
+      <p:regular r:id="rId16"/>
+      <p:bold r:id="rId17"/>
+      <p:italic r:id="rId18"/>
+      <p:boldItalic r:id="rId19"/>
     </p:embeddedFont>
   </p:embeddedFontLst>
   <p:defaultTextStyle>
@@ -136,7 +136,7 @@
   </p:defaultTextStyle>
   <p:extLst>
     <p:ext uri="{EFAFB233-063F-42B5-8137-9DF3F51BA10A}">
-      <p15:sldGuideLst xmlns:p15="http://schemas.microsoft.com/office/powerpoint/2012/main"/>
+      <p15:sldGuideLst xmlns:p15="http://schemas.microsoft.com/office/powerpoint/2012/main" xmlns=""/>
     </p:ext>
   </p:extLst>
 </p:presentation>
@@ -3363,7 +3363,7 @@
         <p:spPr>
           <a:xfrm>
             <a:off x="793790" y="3607237"/>
-            <a:ext cx="10867311" cy="453509"/>
+            <a:ext cx="10848083" cy="1109729"/>
           </a:xfrm>
           <a:prstGeom prst="rect">
             <a:avLst/>
@@ -3390,7 +3390,125 @@
                 <a:ea typeface="DM Sans" pitchFamily="34" charset="-122"/>
                 <a:cs typeface="DM Sans" pitchFamily="34" charset="-120"/>
               </a:rPr>
-              <a:t>В качестве алгоритма решения был выбран метод "квантового обжига".  </a:t>
+              <a:t>В качестве алгоритма решения был выбран метод "</a:t>
+            </a:r>
+            <a:r>
+              <a:rPr lang="en-US" sz="2200" dirty="0" err="1">
+                <a:solidFill>
+                  <a:srgbClr val="383838"/>
+                </a:solidFill>
+                <a:latin typeface="DM Sans" pitchFamily="34" charset="0"/>
+                <a:ea typeface="DM Sans" pitchFamily="34" charset="-122"/>
+                <a:cs typeface="DM Sans" pitchFamily="34" charset="-120"/>
+              </a:rPr>
+              <a:t>квантового</a:t>
+            </a:r>
+            <a:r>
+              <a:rPr lang="en-US" sz="2200" dirty="0">
+                <a:solidFill>
+                  <a:srgbClr val="383838"/>
+                </a:solidFill>
+                <a:latin typeface="DM Sans" pitchFamily="34" charset="0"/>
+                <a:ea typeface="DM Sans" pitchFamily="34" charset="-122"/>
+                <a:cs typeface="DM Sans" pitchFamily="34" charset="-120"/>
+              </a:rPr>
+              <a:t> </a:t>
+            </a:r>
+            <a:r>
+              <a:rPr lang="en-US" sz="2200" dirty="0" smtClean="0">
+                <a:solidFill>
+                  <a:srgbClr val="383838"/>
+                </a:solidFill>
+                <a:latin typeface="DM Sans" pitchFamily="34" charset="0"/>
+                <a:ea typeface="DM Sans" pitchFamily="34" charset="-122"/>
+                <a:cs typeface="DM Sans" pitchFamily="34" charset="-120"/>
+              </a:rPr>
+              <a:t>о</a:t>
+            </a:r>
+            <a:r>
+              <a:rPr lang="ru-RU" sz="2200" dirty="0" smtClean="0">
+                <a:solidFill>
+                  <a:srgbClr val="383838"/>
+                </a:solidFill>
+                <a:latin typeface="DM Sans" pitchFamily="34" charset="0"/>
+                <a:ea typeface="DM Sans" pitchFamily="34" charset="-122"/>
+                <a:cs typeface="DM Sans" pitchFamily="34" charset="-120"/>
+              </a:rPr>
+              <a:t>т</a:t>
+            </a:r>
+            <a:r>
+              <a:rPr lang="en-US" sz="2200" dirty="0" err="1" smtClean="0">
+                <a:solidFill>
+                  <a:srgbClr val="383838"/>
+                </a:solidFill>
+                <a:latin typeface="DM Sans" pitchFamily="34" charset="0"/>
+                <a:ea typeface="DM Sans" pitchFamily="34" charset="-122"/>
+                <a:cs typeface="DM Sans" pitchFamily="34" charset="-120"/>
+              </a:rPr>
+              <a:t>жига</a:t>
+            </a:r>
+            <a:r>
+              <a:rPr lang="en-US" sz="2200" dirty="0">
+                <a:solidFill>
+                  <a:srgbClr val="383838"/>
+                </a:solidFill>
+                <a:latin typeface="DM Sans" pitchFamily="34" charset="0"/>
+                <a:ea typeface="DM Sans" pitchFamily="34" charset="-122"/>
+                <a:cs typeface="DM Sans" pitchFamily="34" charset="-120"/>
+              </a:rPr>
+              <a:t>". </a:t>
+            </a:r>
+            <a:r>
+              <a:rPr lang="ru-RU" sz="2200" dirty="0" smtClean="0">
+                <a:solidFill>
+                  <a:srgbClr val="383838"/>
+                </a:solidFill>
+                <a:latin typeface="DM Sans" pitchFamily="34" charset="0"/>
+                <a:ea typeface="DM Sans" pitchFamily="34" charset="-122"/>
+                <a:cs typeface="DM Sans" pitchFamily="34" charset="-120"/>
+              </a:rPr>
+              <a:t>Имеется</a:t>
+            </a:r>
+          </a:p>
+          <a:p>
+            <a:pPr marL="0" indent="0">
+              <a:lnSpc>
+                <a:spcPts val="3550"/>
+              </a:lnSpc>
+              <a:buNone/>
+            </a:pPr>
+            <a:r>
+              <a:rPr lang="ru-RU" sz="2200" dirty="0" smtClean="0">
+                <a:solidFill>
+                  <a:srgbClr val="383838"/>
+                </a:solidFill>
+                <a:latin typeface="DM Sans" pitchFamily="34" charset="0"/>
+                <a:ea typeface="DM Sans" pitchFamily="34" charset="-122"/>
+                <a:cs typeface="DM Sans" pitchFamily="34" charset="-120"/>
+              </a:rPr>
+              <a:t>ограничение на </a:t>
+            </a:r>
+            <a:r>
+              <a:rPr lang="en-US" sz="2200" dirty="0" smtClean="0">
+                <a:solidFill>
+                  <a:srgbClr val="383838"/>
+                </a:solidFill>
+                <a:latin typeface="DM Sans" pitchFamily="34" charset="0"/>
+                <a:ea typeface="DM Sans" pitchFamily="34" charset="-122"/>
+                <a:cs typeface="DM Sans" pitchFamily="34" charset="-120"/>
+              </a:rPr>
+              <a:t> </a:t>
+            </a:r>
+            <a:r>
+              <a:rPr lang="ru-RU" sz="2200" dirty="0" smtClean="0">
+                <a:solidFill>
+                  <a:srgbClr val="383838"/>
+                </a:solidFill>
+                <a:latin typeface="DM Sans" pitchFamily="34" charset="0"/>
+                <a:ea typeface="DM Sans" pitchFamily="34" charset="-122"/>
+                <a:cs typeface="DM Sans" pitchFamily="34" charset="-120"/>
+              </a:rPr>
+              <a:t>максимальное число риска.</a:t>
             </a:r>
             <a:r>
               <a:rPr lang="ru-RU" sz="2200" dirty="0" smtClean="0">
@@ -3413,39 +3531,6 @@
                 <a:cs typeface="DM Sans" pitchFamily="34" charset="-120"/>
               </a:rPr>
             </a:br>
-            <a:r>
-              <a:rPr lang="ru-RU" sz="2200" dirty="0" smtClean="0">
-                <a:solidFill>
-                  <a:srgbClr val="383838"/>
-                </a:solidFill>
-                <a:latin typeface="DM Sans" pitchFamily="34" charset="0"/>
-                <a:ea typeface="DM Sans" pitchFamily="34" charset="-122"/>
-                <a:cs typeface="DM Sans" pitchFamily="34" charset="-120"/>
-              </a:rPr>
-              <a:t>(попиши что-нибудь </a:t>
-            </a:r>
-            <a:r>
-              <a:rPr lang="ru-RU" sz="2200" dirty="0" err="1" smtClean="0">
-                <a:solidFill>
-                  <a:srgbClr val="383838"/>
-                </a:solidFill>
-                <a:latin typeface="DM Sans" pitchFamily="34" charset="0"/>
-                <a:ea typeface="DM Sans" pitchFamily="34" charset="-122"/>
-                <a:cs typeface="DM Sans" pitchFamily="34" charset="-120"/>
-              </a:rPr>
-              <a:t>пж</a:t>
-            </a:r>
-            <a:r>
-              <a:rPr lang="ru-RU" sz="2200" dirty="0" smtClean="0">
-                <a:solidFill>
-                  <a:srgbClr val="383838"/>
-                </a:solidFill>
-                <a:latin typeface="DM Sans" pitchFamily="34" charset="0"/>
-                <a:ea typeface="DM Sans" pitchFamily="34" charset="-122"/>
-                <a:cs typeface="DM Sans" pitchFamily="34" charset="-120"/>
-              </a:rPr>
-              <a:t>)</a:t>
-            </a:r>
             <a:endParaRPr lang="en-US" sz="2200" dirty="0"/>
           </a:p>
         </p:txBody>
@@ -3643,7 +3728,62 @@
                 <a:ea typeface="DM Sans" pitchFamily="34" charset="-122"/>
                 <a:cs typeface="DM Sans" pitchFamily="34" charset="-120"/>
               </a:rPr>
-              <a:t>Ввиду необходимости в выборе максимального дохода при минимизации целевой функции было принято решение сделать коэффициент q1 отрицательным.</a:t>
+              <a:t>Ввиду необходимости в выборе максимального дохода при минимизации целевой функции было принято </a:t>
+            </a:r>
+            <a:r>
+              <a:rPr lang="en-US" sz="2200" dirty="0" err="1">
+                <a:solidFill>
+                  <a:srgbClr val="383838"/>
+                </a:solidFill>
+                <a:latin typeface="DM Sans" pitchFamily="34" charset="0"/>
+                <a:ea typeface="DM Sans" pitchFamily="34" charset="-122"/>
+                <a:cs typeface="DM Sans" pitchFamily="34" charset="-120"/>
+              </a:rPr>
+              <a:t>решение</a:t>
+            </a:r>
+            <a:r>
+              <a:rPr lang="en-US" sz="2200" dirty="0">
+                <a:solidFill>
+                  <a:srgbClr val="383838"/>
+                </a:solidFill>
+                <a:latin typeface="DM Sans" pitchFamily="34" charset="0"/>
+                <a:ea typeface="DM Sans" pitchFamily="34" charset="-122"/>
+                <a:cs typeface="DM Sans" pitchFamily="34" charset="-120"/>
+              </a:rPr>
+              <a:t> </a:t>
+            </a:r>
+            <a:r>
+              <a:rPr lang="en-US" sz="2200" dirty="0" err="1" smtClean="0">
+                <a:solidFill>
+                  <a:srgbClr val="383838"/>
+                </a:solidFill>
+                <a:latin typeface="DM Sans" pitchFamily="34" charset="0"/>
+                <a:ea typeface="DM Sans" pitchFamily="34" charset="-122"/>
+                <a:cs typeface="DM Sans" pitchFamily="34" charset="-120"/>
+              </a:rPr>
+              <a:t>сделать</a:t>
+            </a:r>
+            <a:r>
+              <a:rPr lang="ru-RU" sz="2200" dirty="0">
+                <a:solidFill>
+                  <a:srgbClr val="383838"/>
+                </a:solidFill>
+                <a:latin typeface="DM Sans" pitchFamily="34" charset="0"/>
+                <a:ea typeface="DM Sans" pitchFamily="34" charset="-122"/>
+                <a:cs typeface="DM Sans" pitchFamily="34" charset="-120"/>
+              </a:rPr>
+              <a:t> </a:t>
+            </a:r>
+            <a:r>
+              <a:rPr lang="ru-RU" sz="2200" dirty="0" smtClean="0">
+                <a:solidFill>
+                  <a:srgbClr val="383838"/>
+                </a:solidFill>
+                <a:latin typeface="DM Sans" pitchFamily="34" charset="0"/>
+                <a:ea typeface="DM Sans" pitchFamily="34" charset="-122"/>
+                <a:cs typeface="DM Sans" pitchFamily="34" charset="-120"/>
+              </a:rPr>
+              <a:t>сумму по доходам отрицательной, а квадратичное отклонение от максимального риска положительным.</a:t>
             </a:r>
             <a:endParaRPr lang="en-US" sz="2200" dirty="0"/>
           </a:p>
@@ -4888,7 +5028,194 @@
                 <a:ea typeface="DM Sans" pitchFamily="34" charset="-122"/>
                 <a:cs typeface="DM Sans" pitchFamily="34" charset="-120"/>
               </a:rPr>
-              <a:t>В качестве средства выполнения данной задачи было принято решение использовать классический подход с использованием фреймворка tensorflow на плотформе colab от Google с использованием библиотеки pandas. Данный подход с разработанным нами решением позхволяет определять является ли отзыв положительным или отрицательным с точностью в 70%. Так же мы ведём разработку квантового варианта решения данной задачи.</a:t>
+              <a:t>В качестве средства выполнения данной задачи было принято решение использовать классический </a:t>
+            </a:r>
+            <a:r>
+              <a:rPr lang="en-US" sz="1750" dirty="0" err="1">
+                <a:solidFill>
+                  <a:srgbClr val="383838"/>
+                </a:solidFill>
+                <a:latin typeface="DM Sans" pitchFamily="34" charset="0"/>
+                <a:ea typeface="DM Sans" pitchFamily="34" charset="-122"/>
+                <a:cs typeface="DM Sans" pitchFamily="34" charset="-120"/>
+              </a:rPr>
+              <a:t>подход</a:t>
+            </a:r>
+            <a:r>
+              <a:rPr lang="en-US" sz="1750" dirty="0">
+                <a:solidFill>
+                  <a:srgbClr val="383838"/>
+                </a:solidFill>
+                <a:latin typeface="DM Sans" pitchFamily="34" charset="0"/>
+                <a:ea typeface="DM Sans" pitchFamily="34" charset="-122"/>
+                <a:cs typeface="DM Sans" pitchFamily="34" charset="-120"/>
+              </a:rPr>
+              <a:t> </a:t>
+            </a:r>
+            <a:r>
+              <a:rPr lang="en-US" sz="1750" dirty="0" err="1" smtClean="0">
+                <a:solidFill>
+                  <a:srgbClr val="383838"/>
+                </a:solidFill>
+                <a:latin typeface="DM Sans" pitchFamily="34" charset="0"/>
+                <a:ea typeface="DM Sans" pitchFamily="34" charset="-122"/>
+                <a:cs typeface="DM Sans" pitchFamily="34" charset="-120"/>
+              </a:rPr>
+              <a:t>на</a:t>
+            </a:r>
+            <a:r>
+              <a:rPr lang="en-US" sz="1750" dirty="0" smtClean="0">
+                <a:solidFill>
+                  <a:srgbClr val="383838"/>
+                </a:solidFill>
+                <a:latin typeface="DM Sans" pitchFamily="34" charset="0"/>
+                <a:ea typeface="DM Sans" pitchFamily="34" charset="-122"/>
+                <a:cs typeface="DM Sans" pitchFamily="34" charset="-120"/>
+              </a:rPr>
+              <a:t> </a:t>
+            </a:r>
+            <a:r>
+              <a:rPr lang="en-US" sz="1750" dirty="0" err="1" smtClean="0">
+                <a:solidFill>
+                  <a:srgbClr val="383838"/>
+                </a:solidFill>
+                <a:latin typeface="DM Sans" pitchFamily="34" charset="0"/>
+                <a:ea typeface="DM Sans" pitchFamily="34" charset="-122"/>
+                <a:cs typeface="DM Sans" pitchFamily="34" charset="-120"/>
+              </a:rPr>
+              <a:t>пл</a:t>
+            </a:r>
+            <a:r>
+              <a:rPr lang="ru-RU" sz="1750" dirty="0" smtClean="0">
+                <a:solidFill>
+                  <a:srgbClr val="383838"/>
+                </a:solidFill>
+                <a:latin typeface="DM Sans" pitchFamily="34" charset="0"/>
+                <a:ea typeface="DM Sans" pitchFamily="34" charset="-122"/>
+                <a:cs typeface="DM Sans" pitchFamily="34" charset="-120"/>
+              </a:rPr>
+              <a:t>а</a:t>
+            </a:r>
+            <a:r>
+              <a:rPr lang="en-US" sz="1750" dirty="0" err="1" smtClean="0">
+                <a:solidFill>
+                  <a:srgbClr val="383838"/>
+                </a:solidFill>
+                <a:latin typeface="DM Sans" pitchFamily="34" charset="0"/>
+                <a:ea typeface="DM Sans" pitchFamily="34" charset="-122"/>
+                <a:cs typeface="DM Sans" pitchFamily="34" charset="-120"/>
+              </a:rPr>
+              <a:t>тформе</a:t>
+            </a:r>
+            <a:r>
+              <a:rPr lang="en-US" sz="1750" dirty="0" smtClean="0">
+                <a:solidFill>
+                  <a:srgbClr val="383838"/>
+                </a:solidFill>
+                <a:latin typeface="DM Sans" pitchFamily="34" charset="0"/>
+                <a:ea typeface="DM Sans" pitchFamily="34" charset="-122"/>
+                <a:cs typeface="DM Sans" pitchFamily="34" charset="-120"/>
+              </a:rPr>
+              <a:t> </a:t>
+            </a:r>
+            <a:r>
+              <a:rPr lang="en-US" sz="1750" dirty="0">
+                <a:solidFill>
+                  <a:srgbClr val="383838"/>
+                </a:solidFill>
+                <a:latin typeface="DM Sans" pitchFamily="34" charset="0"/>
+                <a:ea typeface="DM Sans" pitchFamily="34" charset="-122"/>
+                <a:cs typeface="DM Sans" pitchFamily="34" charset="-120"/>
+              </a:rPr>
+              <a:t>colab от Google с </a:t>
+            </a:r>
+            <a:r>
+              <a:rPr lang="en-US" sz="1750" dirty="0" err="1">
+                <a:solidFill>
+                  <a:srgbClr val="383838"/>
+                </a:solidFill>
+                <a:latin typeface="DM Sans" pitchFamily="34" charset="0"/>
+                <a:ea typeface="DM Sans" pitchFamily="34" charset="-122"/>
+                <a:cs typeface="DM Sans" pitchFamily="34" charset="-120"/>
+              </a:rPr>
+              <a:t>использованием</a:t>
+            </a:r>
+            <a:r>
+              <a:rPr lang="en-US" sz="1750" dirty="0">
+                <a:solidFill>
+                  <a:srgbClr val="383838"/>
+                </a:solidFill>
+                <a:latin typeface="DM Sans" pitchFamily="34" charset="0"/>
+                <a:ea typeface="DM Sans" pitchFamily="34" charset="-122"/>
+                <a:cs typeface="DM Sans" pitchFamily="34" charset="-120"/>
+              </a:rPr>
+              <a:t> </a:t>
+            </a:r>
+            <a:r>
+              <a:rPr lang="en-US" sz="1750" dirty="0" err="1" smtClean="0">
+                <a:solidFill>
+                  <a:srgbClr val="383838"/>
+                </a:solidFill>
+                <a:latin typeface="DM Sans" pitchFamily="34" charset="0"/>
+                <a:ea typeface="DM Sans" pitchFamily="34" charset="-122"/>
+                <a:cs typeface="DM Sans" pitchFamily="34" charset="-120"/>
+              </a:rPr>
+              <a:t>библиотек</a:t>
+            </a:r>
+            <a:r>
+              <a:rPr lang="en-US" sz="1750" dirty="0" smtClean="0">
+                <a:solidFill>
+                  <a:srgbClr val="383838"/>
+                </a:solidFill>
+                <a:latin typeface="DM Sans" pitchFamily="34" charset="0"/>
+                <a:ea typeface="DM Sans" pitchFamily="34" charset="-122"/>
+                <a:cs typeface="DM Sans" pitchFamily="34" charset="-120"/>
+              </a:rPr>
+              <a:t> pandas </a:t>
+            </a:r>
+            <a:r>
+              <a:rPr lang="ru-RU" sz="1750" dirty="0" smtClean="0">
+                <a:solidFill>
+                  <a:srgbClr val="383838"/>
+                </a:solidFill>
+                <a:latin typeface="DM Sans" pitchFamily="34" charset="0"/>
+                <a:ea typeface="DM Sans" pitchFamily="34" charset="-122"/>
+                <a:cs typeface="DM Sans" pitchFamily="34" charset="-120"/>
+              </a:rPr>
+              <a:t>и </a:t>
+            </a:r>
+            <a:r>
+              <a:rPr lang="en-US" sz="1750" dirty="0" err="1" smtClean="0">
+                <a:solidFill>
+                  <a:srgbClr val="383838"/>
+                </a:solidFill>
+                <a:latin typeface="DM Sans" pitchFamily="34" charset="0"/>
+                <a:ea typeface="DM Sans" pitchFamily="34" charset="-122"/>
+                <a:cs typeface="DM Sans" pitchFamily="34" charset="-120"/>
+              </a:rPr>
+              <a:t>TensorFlow</a:t>
+            </a:r>
+            <a:r>
+              <a:rPr lang="en-US" sz="1750" dirty="0" smtClean="0">
+                <a:solidFill>
+                  <a:srgbClr val="383838"/>
+                </a:solidFill>
+                <a:latin typeface="DM Sans" pitchFamily="34" charset="0"/>
+                <a:ea typeface="DM Sans" pitchFamily="34" charset="-122"/>
+                <a:cs typeface="DM Sans" pitchFamily="34" charset="-120"/>
+              </a:rPr>
+              <a:t>. </a:t>
+            </a:r>
+            <a:r>
+              <a:rPr lang="en-US" sz="1750" dirty="0">
+                <a:solidFill>
+                  <a:srgbClr val="383838"/>
+                </a:solidFill>
+                <a:latin typeface="DM Sans" pitchFamily="34" charset="0"/>
+                <a:ea typeface="DM Sans" pitchFamily="34" charset="-122"/>
+                <a:cs typeface="DM Sans" pitchFamily="34" charset="-120"/>
+              </a:rPr>
+              <a:t>Данный подход с разработанным нами решением позхволяет определять является ли отзыв положительным или отрицательным с точностью в 70%. Так же мы ведём разработку квантового варианта решения данной задачи.</a:t>
             </a:r>
             <a:endParaRPr lang="en-US" sz="1750" dirty="0"/>
           </a:p>
@@ -5199,7 +5526,7 @@
     </a:clrScheme>
     <a:fontScheme name="Office">
       <a:majorFont>
-        <a:latin typeface="Calibri Light" panose="020F0302020204030204"/>
+        <a:latin typeface="Calibri Light"/>
         <a:ea typeface=""/>
         <a:cs typeface=""/>
         <a:font script="Jpan" typeface="游ゴシック Light"/>
@@ -5251,7 +5578,7 @@
         <a:font script="Tfng" typeface="Ebrima"/>
       </a:majorFont>
       <a:minorFont>
-        <a:latin typeface="Calibri" panose="020F0502020204030204"/>
+        <a:latin typeface="Calibri"/>
         <a:ea typeface=""/>
         <a:cs typeface=""/>
         <a:font script="Jpan" typeface="游ゴシック"/>
@@ -5445,7 +5772,7 @@
   <a:extraClrSchemeLst/>
   <a:extLst>
     <a:ext uri="{05A4C25C-085E-4340-85A3-A5531E510DB2}">
-      <thm15:themeFamily xmlns:thm15="http://schemas.microsoft.com/office/thememl/2012/main" name="Office Theme" id="{62F939B6-93AF-4DB8-9C6B-D6C7DFDC589F}" vid="{4A3C46E8-61CC-4603-A589-7422A47A8E4A}"/>
+      <thm15:themeFamily xmlns:thm15="http://schemas.microsoft.com/office/thememl/2012/main" xmlns="" name="Office Theme" id="{62F939B6-93AF-4DB8-9C6B-D6C7DFDC589F}" vid="{4A3C46E8-61CC-4603-A589-7422A47A8E4A}"/>
     </a:ext>
   </a:extLst>
 </a:theme>
@@ -5494,7 +5821,7 @@
     </a:clrScheme>
     <a:fontScheme name="Стандартная">
       <a:majorFont>
-        <a:latin typeface="Calibri Light" panose="020F0302020204030204"/>
+        <a:latin typeface="Calibri Light"/>
         <a:ea typeface=""/>
         <a:cs typeface=""/>
         <a:font script="Jpan" typeface="ＭＳ Ｐゴシック"/>
@@ -5529,7 +5856,7 @@
         <a:font script="Geor" typeface="Sylfaen"/>
       </a:majorFont>
       <a:minorFont>
-        <a:latin typeface="Calibri" panose="020F0502020204030204"/>
+        <a:latin typeface="Calibri"/>
         <a:ea typeface=""/>
         <a:cs typeface=""/>
         <a:font script="Jpan" typeface="ＭＳ Ｐゴシック"/>
@@ -5706,7 +6033,7 @@
   <a:extraClrSchemeLst/>
   <a:extLst>
     <a:ext uri="{05A4C25C-085E-4340-85A3-A5531E510DB2}">
-      <thm15:themeFamily xmlns:thm15="http://schemas.microsoft.com/office/thememl/2012/main" name="Office Theme" id="{62F939B6-93AF-4DB8-9C6B-D6C7DFDC589F}" vid="{4A3C46E8-61CC-4603-A589-7422A47A8E4A}"/>
+      <thm15:themeFamily xmlns:thm15="http://schemas.microsoft.com/office/thememl/2012/main" xmlns="" name="Office Theme" id="{62F939B6-93AF-4DB8-9C6B-D6C7DFDC589F}" vid="{4A3C46E8-61CC-4603-A589-7422A47A8E4A}"/>
     </a:ext>
   </a:extLst>
 </a:theme>

</xml_diff>